<commit_message>
Added library DB structure slide
</commit_message>
<xml_diff>
--- a/SQL/sql-lib.pptx
+++ b/SQL/sql-lib.pptx
@@ -298,7 +298,7 @@
           <a:p>
             <a:fld id="{4193FD9C-507C-514D-95ED-FC5F79274887}" type="datetimeFigureOut">
               <a:rPr lang="en-US" smtClean="0"/>
-              <a:t>05/08/15</a:t>
+              <a:t>08/08/15</a:t>
             </a:fld>
             <a:endParaRPr lang="en-US"/>
           </a:p>
@@ -468,7 +468,7 @@
           <a:p>
             <a:fld id="{4193FD9C-507C-514D-95ED-FC5F79274887}" type="datetimeFigureOut">
               <a:rPr lang="en-US" smtClean="0"/>
-              <a:t>05/08/15</a:t>
+              <a:t>08/08/15</a:t>
             </a:fld>
             <a:endParaRPr lang="en-US"/>
           </a:p>
@@ -648,7 +648,7 @@
           <a:p>
             <a:fld id="{4193FD9C-507C-514D-95ED-FC5F79274887}" type="datetimeFigureOut">
               <a:rPr lang="en-US" smtClean="0"/>
-              <a:t>05/08/15</a:t>
+              <a:t>08/08/15</a:t>
             </a:fld>
             <a:endParaRPr lang="en-US"/>
           </a:p>
@@ -818,7 +818,7 @@
           <a:p>
             <a:fld id="{4193FD9C-507C-514D-95ED-FC5F79274887}" type="datetimeFigureOut">
               <a:rPr lang="en-US" smtClean="0"/>
-              <a:t>05/08/15</a:t>
+              <a:t>08/08/15</a:t>
             </a:fld>
             <a:endParaRPr lang="en-US"/>
           </a:p>
@@ -1064,7 +1064,7 @@
           <a:p>
             <a:fld id="{4193FD9C-507C-514D-95ED-FC5F79274887}" type="datetimeFigureOut">
               <a:rPr lang="en-US" smtClean="0"/>
-              <a:t>05/08/15</a:t>
+              <a:t>08/08/15</a:t>
             </a:fld>
             <a:endParaRPr lang="en-US"/>
           </a:p>
@@ -1352,7 +1352,7 @@
           <a:p>
             <a:fld id="{4193FD9C-507C-514D-95ED-FC5F79274887}" type="datetimeFigureOut">
               <a:rPr lang="en-US" smtClean="0"/>
-              <a:t>05/08/15</a:t>
+              <a:t>08/08/15</a:t>
             </a:fld>
             <a:endParaRPr lang="en-US"/>
           </a:p>
@@ -1774,7 +1774,7 @@
           <a:p>
             <a:fld id="{4193FD9C-507C-514D-95ED-FC5F79274887}" type="datetimeFigureOut">
               <a:rPr lang="en-US" smtClean="0"/>
-              <a:t>05/08/15</a:t>
+              <a:t>08/08/15</a:t>
             </a:fld>
             <a:endParaRPr lang="en-US"/>
           </a:p>
@@ -1892,7 +1892,7 @@
           <a:p>
             <a:fld id="{4193FD9C-507C-514D-95ED-FC5F79274887}" type="datetimeFigureOut">
               <a:rPr lang="en-US" smtClean="0"/>
-              <a:t>05/08/15</a:t>
+              <a:t>08/08/15</a:t>
             </a:fld>
             <a:endParaRPr lang="en-US"/>
           </a:p>
@@ -1987,7 +1987,7 @@
           <a:p>
             <a:fld id="{4193FD9C-507C-514D-95ED-FC5F79274887}" type="datetimeFigureOut">
               <a:rPr lang="en-US" smtClean="0"/>
-              <a:t>05/08/15</a:t>
+              <a:t>08/08/15</a:t>
             </a:fld>
             <a:endParaRPr lang="en-US"/>
           </a:p>
@@ -2264,7 +2264,7 @@
           <a:p>
             <a:fld id="{4193FD9C-507C-514D-95ED-FC5F79274887}" type="datetimeFigureOut">
               <a:rPr lang="en-US" smtClean="0"/>
-              <a:t>05/08/15</a:t>
+              <a:t>08/08/15</a:t>
             </a:fld>
             <a:endParaRPr lang="en-US"/>
           </a:p>
@@ -2517,7 +2517,7 @@
           <a:p>
             <a:fld id="{4193FD9C-507C-514D-95ED-FC5F79274887}" type="datetimeFigureOut">
               <a:rPr lang="en-US" smtClean="0"/>
-              <a:t>05/08/15</a:t>
+              <a:t>08/08/15</a:t>
             </a:fld>
             <a:endParaRPr lang="en-US"/>
           </a:p>
@@ -2730,7 +2730,7 @@
           <a:p>
             <a:fld id="{4193FD9C-507C-514D-95ED-FC5F79274887}" type="datetimeFigureOut">
               <a:rPr lang="en-US" smtClean="0"/>
-              <a:t>05/08/15</a:t>
+              <a:t>08/08/15</a:t>
             </a:fld>
             <a:endParaRPr lang="en-US"/>
           </a:p>
@@ -3704,14 +3704,14 @@
           <p:nvPr>
             <p:extLst>
               <p:ext uri="{D42A27DB-BD31-4B8C-83A1-F6EECF244321}">
-                <p14:modId xmlns:p14="http://schemas.microsoft.com/office/powerpoint/2010/main" val="1891962643"/>
+                <p14:modId xmlns:p14="http://schemas.microsoft.com/office/powerpoint/2010/main" val="1673404967"/>
               </p:ext>
             </p:extLst>
           </p:nvPr>
         </p:nvGraphicFramePr>
         <p:xfrm>
           <a:off x="3652806" y="5127207"/>
-          <a:ext cx="5046137" cy="1280160"/>
+          <a:ext cx="5046137" cy="1097280"/>
         </p:xfrm>
         <a:graphic>
           <a:graphicData uri="http://schemas.openxmlformats.org/drawingml/2006/table">
@@ -3721,8 +3721,8 @@
               </a:tblPr>
               <a:tblGrid>
                 <a:gridCol w="711070"/>
-                <a:gridCol w="711072"/>
-                <a:gridCol w="1390086"/>
+                <a:gridCol w="838985"/>
+                <a:gridCol w="1262173"/>
                 <a:gridCol w="1224682"/>
                 <a:gridCol w="1009227"/>
               </a:tblGrid>
@@ -5174,7 +5174,7 @@
         </p:nvCxnSpPr>
         <p:spPr>
           <a:xfrm>
-            <a:off x="4012293" y="4845172"/>
+            <a:off x="4699105" y="4845172"/>
             <a:ext cx="0" cy="182516"/>
           </a:xfrm>
           <a:prstGeom prst="straightConnector1">
@@ -5237,8 +5237,8 @@
         </p:nvCxnSpPr>
         <p:spPr>
           <a:xfrm>
-            <a:off x="1036477" y="4830316"/>
-            <a:ext cx="2975816" cy="0"/>
+            <a:off x="1036698" y="4845172"/>
+            <a:ext cx="3662407" cy="14856"/>
           </a:xfrm>
           <a:prstGeom prst="line">
             <a:avLst/>
@@ -5569,7 +5569,6 @@
               <a:rPr lang="en-US" dirty="0"/>
               <a:t> table. Warning: avoid duplicates!</a:t>
             </a:r>
-            <a:endParaRPr lang="en-US" dirty="0"/>
           </a:p>
         </p:txBody>
       </p:sp>
@@ -6210,11 +6209,7 @@
           <a:p>
             <a:r>
               <a:rPr lang="en-US" dirty="0" smtClean="0"/>
-              <a:t>C</a:t>
-            </a:r>
-            <a:r>
-              <a:rPr lang="en-US" dirty="0" smtClean="0"/>
-              <a:t>hallenge</a:t>
+              <a:t>Challenge</a:t>
             </a:r>
             <a:endParaRPr lang="en-US" dirty="0"/>
           </a:p>
@@ -6914,15 +6909,7 @@
           <a:p>
             <a:r>
               <a:rPr lang="en-US" dirty="0" smtClean="0"/>
-              <a:t>Write a query that selects only </a:t>
-            </a:r>
-            <a:r>
-              <a:rPr lang="en-US" dirty="0" smtClean="0"/>
-              <a:t>titles from </a:t>
-            </a:r>
-            <a:r>
-              <a:rPr lang="en-US" dirty="0" smtClean="0"/>
-              <a:t>the </a:t>
+              <a:t>Write a query that selects only titles from the </a:t>
             </a:r>
             <a:r>
               <a:rPr lang="en-US" b="1" dirty="0" smtClean="0"/>
@@ -8246,6 +8233,13 @@
   <p:clrMapOvr>
     <a:masterClrMapping/>
   </p:clrMapOvr>
+  <p:timing>
+    <p:tnLst>
+      <p:par>
+        <p:cTn xmlns:p14="http://schemas.microsoft.com/office/powerpoint/2010/main" id="1" dur="indefinite" restart="never" nodeType="tmRoot"/>
+      </p:par>
+    </p:tnLst>
+  </p:timing>
 </p:sld>
 </file>
 
@@ -9006,13 +9000,12 @@
             </a:r>
             <a:r>
               <a:rPr lang="en-US" dirty="0" smtClean="0"/>
-              <a:t>that date </a:t>
+              <a:t>the birth date </a:t>
             </a:r>
             <a:r>
               <a:rPr lang="en-US" dirty="0"/>
               <a:t>is not known (i.e., is null).</a:t>
             </a:r>
-            <a:endParaRPr lang="en-US" dirty="0"/>
           </a:p>
         </p:txBody>
       </p:sp>
@@ -9760,7 +9753,6 @@
               <a:rPr lang="en-US" dirty="0"/>
               <a:t> edition, along with their role?</a:t>
             </a:r>
-            <a:endParaRPr lang="en-US" dirty="0"/>
           </a:p>
         </p:txBody>
       </p:sp>

</xml_diff>